<commit_message>
add english example, start adding translation
</commit_message>
<xml_diff>
--- a/downloads/canvas/homepage-canvas.pptx
+++ b/downloads/canvas/homepage-canvas.pptx
@@ -1475,7 +1475,7 @@
                   <a:schemeClr val="tx1"/>
                 </a:solidFill>
               </a:rPr>
-              <a:t>// placeholder</a:t>
+              <a:t>// placeholder, fill me out </a:t>
             </a:r>
           </a:p>
         </p:txBody>
@@ -1533,7 +1533,7 @@
                   <a:schemeClr val="tx1"/>
                 </a:solidFill>
               </a:rPr>
-              <a:t>// placeholder</a:t>
+              <a:t>// placeholder, fill me out </a:t>
             </a:r>
           </a:p>
         </p:txBody>
@@ -1591,7 +1591,7 @@
                   <a:schemeClr val="tx1"/>
                 </a:solidFill>
               </a:rPr>
-              <a:t>// placeholder</a:t>
+              <a:t>// placeholder, fill me out </a:t>
             </a:r>
           </a:p>
         </p:txBody>
@@ -1649,7 +1649,7 @@
                   <a:schemeClr val="tx1"/>
                 </a:solidFill>
               </a:rPr>
-              <a:t>// placeholder</a:t>
+              <a:t>// placeholder, fill me out </a:t>
             </a:r>
           </a:p>
         </p:txBody>
@@ -1707,7 +1707,7 @@
                   <a:schemeClr val="tx1"/>
                 </a:solidFill>
               </a:rPr>
-              <a:t>// placeholder</a:t>
+              <a:t>// placeholder, fill me out </a:t>
             </a:r>
           </a:p>
         </p:txBody>
@@ -1765,7 +1765,7 @@
                   <a:schemeClr val="tx1"/>
                 </a:solidFill>
               </a:rPr>
-              <a:t>// placeholder</a:t>
+              <a:t>// placeholder, fill me out </a:t>
             </a:r>
           </a:p>
         </p:txBody>
@@ -1823,7 +1823,7 @@
                   <a:schemeClr val="tx1"/>
                 </a:solidFill>
               </a:rPr>
-              <a:t>// placeholder</a:t>
+              <a:t>// placeholder, fill me out </a:t>
             </a:r>
           </a:p>
         </p:txBody>
@@ -1881,7 +1881,7 @@
                   <a:schemeClr val="tx1"/>
                 </a:solidFill>
               </a:rPr>
-              <a:t>// placeholder</a:t>
+              <a:t>// placeholder, fill me out </a:t>
             </a:r>
           </a:p>
         </p:txBody>
@@ -1939,7 +1939,59 @@
                   <a:schemeClr val="tx1"/>
                 </a:solidFill>
               </a:rPr>
-              <a:t>// placeholder</a:t>
+              <a:t>// placeholder, fill me out </a:t>
+            </a:r>
+          </a:p>
+        </p:txBody>
+      </p:sp>
+      <p:sp>
+        <p:nvSpPr>
+          <p:cNvPr id="2" name="Rechteck 1">
+            <a:extLst>
+              <a:ext uri="{FF2B5EF4-FFF2-40B4-BE49-F238E27FC236}">
+                <a16:creationId xmlns:a16="http://schemas.microsoft.com/office/drawing/2014/main" id="{5BA38206-ECDC-1892-FFEB-649452E18B34}"/>
+              </a:ext>
+            </a:extLst>
+          </p:cNvPr>
+          <p:cNvSpPr/>
+          <p:nvPr/>
+        </p:nvSpPr>
+        <p:spPr>
+          <a:xfrm>
+            <a:off x="8505919" y="94593"/>
+            <a:ext cx="3260510" cy="557047"/>
+          </a:xfrm>
+          <a:prstGeom prst="rect">
+            <a:avLst/>
+          </a:prstGeom>
+        </p:spPr>
+        <p:style>
+          <a:lnRef idx="2">
+            <a:schemeClr val="accent1">
+              <a:shade val="15000"/>
+            </a:schemeClr>
+          </a:lnRef>
+          <a:fillRef idx="1">
+            <a:schemeClr val="accent1"/>
+          </a:fillRef>
+          <a:effectRef idx="0">
+            <a:schemeClr val="accent1"/>
+          </a:effectRef>
+          <a:fontRef idx="minor">
+            <a:schemeClr val="lt1"/>
+          </a:fontRef>
+        </p:style>
+        <p:txBody>
+          <a:bodyPr rtlCol="0" anchor="ctr"/>
+          <a:lstStyle/>
+          <a:p>
+            <a:r>
+              <a:rPr lang="en-US" u="sng" dirty="0"/>
+              <a:t>Project:</a:t>
+            </a:r>
+            <a:r>
+              <a:rPr lang="en-US" dirty="0"/>
+              <a:t> Fill in project name</a:t>
             </a:r>
           </a:p>
         </p:txBody>

</xml_diff>